<commit_message>
fix: typo for metrics
</commit_message>
<xml_diff>
--- a/docs/nginx-quota-limit.pptx
+++ b/docs/nginx-quota-limit.pptx
@@ -5229,7 +5229,7 @@
         </p:nvSpPr>
         <p:spPr>
           <a:xfrm>
-            <a:off x="4244266" y="1364098"/>
+            <a:off x="4218866" y="1364098"/>
             <a:ext cx="137160" cy="137160"/>
           </a:xfrm>
           <a:prstGeom prst="ellipse">
@@ -5302,7 +5302,7 @@
         </p:nvSpPr>
         <p:spPr>
           <a:xfrm>
-            <a:off x="4433580" y="1348432"/>
+            <a:off x="4408180" y="1348432"/>
             <a:ext cx="1743936" cy="169277"/>
           </a:xfrm>
           <a:prstGeom prst="rect">
@@ -5318,7 +5318,7 @@
           <a:p>
             <a:r>
               <a:rPr lang="en-US" sz="1100" dirty="0"/>
-              <a:t>matrix mgmt.</a:t>
+              <a:t>metrics mgmt.</a:t>
             </a:r>
           </a:p>
         </p:txBody>

</xml_diff>

<commit_message>
chore: quota module flow
</commit_message>
<xml_diff>
--- a/docs/nginx-quota-limit.pptx
+++ b/docs/nginx-quota-limit.pptx
@@ -3670,10 +3670,10 @@
         </p:nvGrpSpPr>
         <p:grpSpPr>
           <a:xfrm>
-            <a:off x="4546599" y="1968500"/>
-            <a:ext cx="1298758" cy="698500"/>
-            <a:chOff x="4546599" y="1943100"/>
-            <a:chExt cx="1145309" cy="698500"/>
+            <a:off x="4546599" y="2202275"/>
+            <a:ext cx="1298758" cy="464724"/>
+            <a:chOff x="4546599" y="2111542"/>
+            <a:chExt cx="1145309" cy="530057"/>
           </a:xfrm>
         </p:grpSpPr>
         <p:sp>
@@ -3690,8 +3690,8 @@
           </p:nvSpPr>
           <p:spPr>
             <a:xfrm>
-              <a:off x="4546599" y="1943100"/>
-              <a:ext cx="1094509" cy="698500"/>
+              <a:off x="4546599" y="2111542"/>
+              <a:ext cx="1094509" cy="530057"/>
             </a:xfrm>
             <a:prstGeom prst="flowChartInternalStorage">
               <a:avLst/>
@@ -3749,8 +3749,8 @@
           </p:nvSpPr>
           <p:spPr>
             <a:xfrm>
-              <a:off x="4648200" y="2049223"/>
-              <a:ext cx="1043708" cy="553998"/>
+              <a:off x="4648200" y="2198052"/>
+              <a:ext cx="1043708" cy="421255"/>
             </a:xfrm>
             <a:prstGeom prst="rect">
               <a:avLst/>
@@ -3795,79 +3795,7 @@
                   <a:ea typeface="+mn-ea"/>
                   <a:cs typeface="+mn-cs"/>
                 </a:rPr>
-                <a:t>quota products</a:t>
-              </a:r>
-            </a:p>
-            <a:p>
-              <a:pPr marL="68263" marR="0" lvl="0" indent="-68263" algn="l" defTabSz="914400" rtl="0" eaLnBrk="1" fontAlgn="auto" latinLnBrk="0" hangingPunct="1">
-                <a:lnSpc>
-                  <a:spcPct val="100000"/>
-                </a:lnSpc>
-                <a:spcBef>
-                  <a:spcPts val="0"/>
-                </a:spcBef>
-                <a:spcAft>
-                  <a:spcPts val="0"/>
-                </a:spcAft>
-                <a:buClrTx/>
-                <a:buSzTx/>
-                <a:buFont typeface="Arial" panose="020B0604020202020204" pitchFamily="34" charset="0"/>
-                <a:buChar char="•"/>
-                <a:tabLst/>
-                <a:defRPr/>
-              </a:pPr>
-              <a:r>
-                <a:rPr kumimoji="0" lang="en-US" sz="1200" b="0" i="0" u="none" strike="noStrike" kern="1200" cap="none" spc="0" normalizeH="0" baseline="0" noProof="0" dirty="0">
-                  <a:ln>
-                    <a:noFill/>
-                  </a:ln>
-                  <a:solidFill>
-                    <a:prstClr val="black"/>
-                  </a:solidFill>
-                  <a:effectLst/>
-                  <a:uLnTx/>
-                  <a:uFillTx/>
-                  <a:latin typeface="Calibri" panose="020F0502020204030204"/>
-                  <a:ea typeface="+mn-ea"/>
-                  <a:cs typeface="+mn-cs"/>
-                </a:rPr>
-                <a:t>quota/user/api</a:t>
-              </a:r>
-            </a:p>
-            <a:p>
-              <a:pPr marL="68263" marR="0" lvl="0" indent="-68263" algn="l" defTabSz="914400" rtl="0" eaLnBrk="1" fontAlgn="auto" latinLnBrk="0" hangingPunct="1">
-                <a:lnSpc>
-                  <a:spcPct val="100000"/>
-                </a:lnSpc>
-                <a:spcBef>
-                  <a:spcPts val="0"/>
-                </a:spcBef>
-                <a:spcAft>
-                  <a:spcPts val="0"/>
-                </a:spcAft>
-                <a:buClrTx/>
-                <a:buSzTx/>
-                <a:buFont typeface="Arial" panose="020B0604020202020204" pitchFamily="34" charset="0"/>
-                <a:buChar char="•"/>
-                <a:tabLst/>
-                <a:defRPr/>
-              </a:pPr>
-              <a:r>
-                <a:rPr kumimoji="0" lang="en-US" sz="1200" b="0" i="0" u="none" strike="noStrike" kern="1200" cap="none" spc="0" normalizeH="0" baseline="0" noProof="0" dirty="0">
-                  <a:ln>
-                    <a:noFill/>
-                  </a:ln>
-                  <a:solidFill>
-                    <a:prstClr val="black"/>
-                  </a:solidFill>
-                  <a:effectLst/>
-                  <a:uLnTx/>
-                  <a:uFillTx/>
-                  <a:latin typeface="Calibri" panose="020F0502020204030204"/>
-                  <a:ea typeface="+mn-ea"/>
-                  <a:cs typeface="+mn-cs"/>
-                </a:rPr>
-                <a:t>quota status</a:t>
+                <a:t>quota meta quota status</a:t>
               </a:r>
             </a:p>
           </p:txBody>
@@ -3977,8 +3905,8 @@
         </p:nvGrpSpPr>
         <p:grpSpPr>
           <a:xfrm>
-            <a:off x="4546599" y="3454400"/>
-            <a:ext cx="1298758" cy="698500"/>
+            <a:off x="4546599" y="3685568"/>
+            <a:ext cx="1298758" cy="467331"/>
             <a:chOff x="4546599" y="1943100"/>
             <a:chExt cx="1145309" cy="698500"/>
           </a:xfrm>
@@ -4056,8 +3984,8 @@
           </p:nvSpPr>
           <p:spPr>
             <a:xfrm>
-              <a:off x="4648200" y="2061923"/>
-              <a:ext cx="1043708" cy="553998"/>
+              <a:off x="4648200" y="2043619"/>
+              <a:ext cx="1043708" cy="552025"/>
             </a:xfrm>
             <a:prstGeom prst="rect">
               <a:avLst/>
@@ -4102,43 +4030,7 @@
                   <a:ea typeface="+mn-ea"/>
                   <a:cs typeface="+mn-cs"/>
                 </a:rPr>
-                <a:t>quota policy</a:t>
-              </a:r>
-            </a:p>
-            <a:p>
-              <a:pPr marL="68263" marR="0" lvl="0" indent="-68263" algn="l" defTabSz="914400" rtl="0" eaLnBrk="1" fontAlgn="auto" latinLnBrk="0" hangingPunct="1">
-                <a:lnSpc>
-                  <a:spcPct val="100000"/>
-                </a:lnSpc>
-                <a:spcBef>
-                  <a:spcPts val="0"/>
-                </a:spcBef>
-                <a:spcAft>
-                  <a:spcPts val="0"/>
-                </a:spcAft>
-                <a:buClrTx/>
-                <a:buSzTx/>
-                <a:buFont typeface="Arial" panose="020B0604020202020204" pitchFamily="34" charset="0"/>
-                <a:buChar char="•"/>
-                <a:tabLst/>
-                <a:defRPr/>
-              </a:pPr>
-              <a:r>
-                <a:rPr kumimoji="0" lang="en-US" sz="1200" b="0" i="0" u="none" strike="noStrike" kern="1200" cap="none" spc="0" normalizeH="0" baseline="0" noProof="0" dirty="0">
-                  <a:ln>
-                    <a:noFill/>
-                  </a:ln>
-                  <a:solidFill>
-                    <a:prstClr val="black"/>
-                  </a:solidFill>
-                  <a:effectLst/>
-                  <a:uLnTx/>
-                  <a:uFillTx/>
-                  <a:latin typeface="Calibri" panose="020F0502020204030204"/>
-                  <a:ea typeface="+mn-ea"/>
-                  <a:cs typeface="+mn-cs"/>
-                </a:rPr>
-                <a:t>quota / user</a:t>
+                <a:t>quota meta </a:t>
               </a:r>
             </a:p>
             <a:p>
@@ -5011,7 +4903,7 @@
         </p:nvSpPr>
         <p:spPr>
           <a:xfrm>
-            <a:off x="3926766" y="1795898"/>
+            <a:off x="4422066" y="1846698"/>
             <a:ext cx="137160" cy="137160"/>
           </a:xfrm>
           <a:prstGeom prst="ellipse">
@@ -5076,8 +4968,8 @@
         </p:nvSpPr>
         <p:spPr>
           <a:xfrm>
-            <a:off x="4116080" y="1780232"/>
-            <a:ext cx="1743936" cy="169277"/>
+            <a:off x="4598681" y="1831032"/>
+            <a:ext cx="1214470" cy="338554"/>
           </a:xfrm>
           <a:prstGeom prst="rect">
             <a:avLst/>
@@ -5092,7 +4984,7 @@
           <a:p>
             <a:r>
               <a:rPr lang="en-US" sz="1100" dirty="0"/>
-              <a:t>Configure quota meta data</a:t>
+              <a:t>Config meta data and key/val store</a:t>
             </a:r>
           </a:p>
         </p:txBody>
@@ -5113,7 +5005,7 @@
         </p:nvSpPr>
         <p:spPr>
           <a:xfrm>
-            <a:off x="5681443" y="3091441"/>
+            <a:off x="5706843" y="3091441"/>
             <a:ext cx="137160" cy="137160"/>
           </a:xfrm>
           <a:prstGeom prst="ellipse">
@@ -5178,7 +5070,7 @@
         </p:nvSpPr>
         <p:spPr>
           <a:xfrm>
-            <a:off x="5845357" y="3075775"/>
+            <a:off x="5858057" y="3075775"/>
             <a:ext cx="1266333" cy="338554"/>
           </a:xfrm>
           <a:prstGeom prst="rect">
@@ -5387,8 +5279,8 @@
         </p:nvCxnSpPr>
         <p:spPr>
           <a:xfrm>
-            <a:off x="5167175" y="4152900"/>
-            <a:ext cx="1" cy="222209"/>
+            <a:off x="5167175" y="4152899"/>
+            <a:ext cx="1" cy="222210"/>
           </a:xfrm>
           <a:prstGeom prst="straightConnector1">
             <a:avLst/>
@@ -5434,8 +5326,8 @@
         </p:nvCxnSpPr>
         <p:spPr>
           <a:xfrm rot="10800000">
-            <a:off x="4546599" y="2317750"/>
-            <a:ext cx="12700" cy="1485900"/>
+            <a:off x="4546599" y="2434638"/>
+            <a:ext cx="12700" cy="1484597"/>
           </a:xfrm>
           <a:prstGeom prst="bentConnector3">
             <a:avLst>
@@ -5466,6 +5358,212 @@
           </a:fontRef>
         </p:style>
       </p:cxnSp>
+      <p:sp>
+        <p:nvSpPr>
+          <p:cNvPr id="63" name="직사각형 363">
+            <a:extLst>
+              <a:ext uri="{FF2B5EF4-FFF2-40B4-BE49-F238E27FC236}">
+                <a16:creationId xmlns:a16="http://schemas.microsoft.com/office/drawing/2014/main" id="{C82D4F73-628A-DBF1-BD72-8B47E756F0BE}"/>
+              </a:ext>
+            </a:extLst>
+          </p:cNvPr>
+          <p:cNvSpPr/>
+          <p:nvPr/>
+        </p:nvSpPr>
+        <p:spPr>
+          <a:xfrm>
+            <a:off x="10020303" y="5897691"/>
+            <a:ext cx="835890" cy="359218"/>
+          </a:xfrm>
+          <a:prstGeom prst="rect">
+            <a:avLst/>
+          </a:prstGeom>
+          <a:solidFill>
+            <a:schemeClr val="accent4">
+              <a:lumMod val="20000"/>
+              <a:lumOff val="80000"/>
+            </a:schemeClr>
+          </a:solidFill>
+          <a:ln w="12700" cap="flat" cmpd="sng" algn="ctr">
+            <a:solidFill>
+              <a:schemeClr val="accent4">
+                <a:lumMod val="50000"/>
+              </a:schemeClr>
+            </a:solidFill>
+            <a:prstDash val="solid"/>
+            <a:miter lim="800000"/>
+          </a:ln>
+          <a:effectLst/>
+        </p:spPr>
+        <p:txBody>
+          <a:bodyPr lIns="0" rIns="0" rtlCol="0" anchor="ctr"/>
+          <a:lstStyle/>
+          <a:p>
+            <a:pPr marL="0" marR="0" lvl="0" indent="0" algn="ctr" defTabSz="914400" eaLnBrk="1" fontAlgn="auto" latinLnBrk="0" hangingPunct="1">
+              <a:spcBef>
+                <a:spcPts val="0"/>
+              </a:spcBef>
+              <a:spcAft>
+                <a:spcPts val="0"/>
+              </a:spcAft>
+              <a:buClrTx/>
+              <a:buSzTx/>
+              <a:buFontTx/>
+              <a:buNone/>
+              <a:tabLst/>
+              <a:defRPr/>
+            </a:pPr>
+            <a:r>
+              <a:rPr kumimoji="0" lang="en-US" altLang="ko-KR" sz="1200" b="0" i="0" u="none" strike="noStrike" kern="0" cap="none" spc="0" normalizeH="0" baseline="0" noProof="0" dirty="0">
+                <a:ln>
+                  <a:noFill/>
+                </a:ln>
+                <a:solidFill>
+                  <a:prstClr val="black"/>
+                </a:solidFill>
+                <a:effectLst/>
+                <a:uLnTx/>
+                <a:uFillTx/>
+                <a:latin typeface="Calibri" panose="020F0502020204030204" pitchFamily="34" charset="0"/>
+                <a:ea typeface="맑은 고딕"/>
+              </a:rPr>
+              <a:t>Quota Module</a:t>
+            </a:r>
+            <a:endParaRPr kumimoji="0" lang="ko-KR" altLang="en-US" sz="1200" b="0" i="0" u="none" strike="noStrike" kern="0" cap="none" spc="0" normalizeH="0" baseline="0" noProof="0" dirty="0">
+              <a:ln>
+                <a:noFill/>
+              </a:ln>
+              <a:solidFill>
+                <a:schemeClr val="tx1">
+                  <a:lumMod val="50000"/>
+                  <a:lumOff val="50000"/>
+                </a:schemeClr>
+              </a:solidFill>
+              <a:effectLst/>
+              <a:uLnTx/>
+              <a:uFillTx/>
+              <a:latin typeface="Calibri" panose="020F0502020204030204" pitchFamily="34" charset="0"/>
+              <a:ea typeface="맑은 고딕"/>
+            </a:endParaRPr>
+          </a:p>
+        </p:txBody>
+      </p:sp>
+      <p:sp>
+        <p:nvSpPr>
+          <p:cNvPr id="1024" name="직사각형 363">
+            <a:extLst>
+              <a:ext uri="{FF2B5EF4-FFF2-40B4-BE49-F238E27FC236}">
+                <a16:creationId xmlns:a16="http://schemas.microsoft.com/office/drawing/2014/main" id="{55D2F201-4C3A-4375-D72B-FAD66830F9EC}"/>
+              </a:ext>
+            </a:extLst>
+          </p:cNvPr>
+          <p:cNvSpPr/>
+          <p:nvPr/>
+        </p:nvSpPr>
+        <p:spPr>
+          <a:xfrm>
+            <a:off x="10920437" y="5899352"/>
+            <a:ext cx="835890" cy="359218"/>
+          </a:xfrm>
+          <a:prstGeom prst="rect">
+            <a:avLst/>
+          </a:prstGeom>
+          <a:solidFill>
+            <a:schemeClr val="accent5">
+              <a:lumMod val="20000"/>
+              <a:lumOff val="80000"/>
+            </a:schemeClr>
+          </a:solidFill>
+          <a:ln w="12700" cap="flat" cmpd="sng" algn="ctr">
+            <a:solidFill>
+              <a:schemeClr val="accent3">
+                <a:lumMod val="50000"/>
+              </a:schemeClr>
+            </a:solidFill>
+            <a:prstDash val="solid"/>
+            <a:miter lim="800000"/>
+          </a:ln>
+          <a:effectLst/>
+        </p:spPr>
+        <p:txBody>
+          <a:bodyPr lIns="0" rIns="0" rtlCol="0" anchor="ctr"/>
+          <a:lstStyle/>
+          <a:p>
+            <a:pPr marL="0" marR="0" lvl="0" indent="0" algn="ctr" defTabSz="914400" eaLnBrk="1" fontAlgn="auto" latinLnBrk="0" hangingPunct="1">
+              <a:spcBef>
+                <a:spcPts val="0"/>
+              </a:spcBef>
+              <a:spcAft>
+                <a:spcPts val="0"/>
+              </a:spcAft>
+              <a:buClrTx/>
+              <a:buSzTx/>
+              <a:buFontTx/>
+              <a:buNone/>
+              <a:tabLst/>
+              <a:defRPr/>
+            </a:pPr>
+            <a:r>
+              <a:rPr kumimoji="0" lang="en-US" altLang="ko-KR" sz="1200" b="0" i="0" u="none" strike="noStrike" kern="0" cap="none" spc="0" normalizeH="0" baseline="0" noProof="0" dirty="0">
+                <a:ln>
+                  <a:noFill/>
+                </a:ln>
+                <a:solidFill>
+                  <a:prstClr val="black"/>
+                </a:solidFill>
+                <a:effectLst/>
+                <a:uLnTx/>
+                <a:uFillTx/>
+                <a:latin typeface="Calibri" panose="020F0502020204030204" pitchFamily="34" charset="0"/>
+                <a:ea typeface="맑은 고딕"/>
+              </a:rPr>
+              <a:t>Payment </a:t>
+            </a:r>
+          </a:p>
+          <a:p>
+            <a:pPr marL="0" marR="0" lvl="0" indent="0" algn="ctr" defTabSz="914400" eaLnBrk="1" fontAlgn="auto" latinLnBrk="0" hangingPunct="1">
+              <a:spcBef>
+                <a:spcPts val="0"/>
+              </a:spcBef>
+              <a:spcAft>
+                <a:spcPts val="0"/>
+              </a:spcAft>
+              <a:buClrTx/>
+              <a:buSzTx/>
+              <a:buFontTx/>
+              <a:buNone/>
+              <a:tabLst/>
+              <a:defRPr/>
+            </a:pPr>
+            <a:r>
+              <a:rPr lang="en-US" altLang="ko-KR" sz="1200" kern="0" dirty="0">
+                <a:solidFill>
+                  <a:prstClr val="black"/>
+                </a:solidFill>
+                <a:latin typeface="Calibri" panose="020F0502020204030204" pitchFamily="34" charset="0"/>
+                <a:ea typeface="맑은 고딕"/>
+              </a:rPr>
+              <a:t>Module</a:t>
+            </a:r>
+            <a:endParaRPr kumimoji="0" lang="ko-KR" altLang="en-US" sz="1200" b="0" i="0" u="none" strike="noStrike" kern="0" cap="none" spc="0" normalizeH="0" baseline="0" noProof="0" dirty="0">
+              <a:ln>
+                <a:noFill/>
+              </a:ln>
+              <a:solidFill>
+                <a:schemeClr val="tx1">
+                  <a:lumMod val="50000"/>
+                  <a:lumOff val="50000"/>
+                </a:schemeClr>
+              </a:solidFill>
+              <a:effectLst/>
+              <a:uLnTx/>
+              <a:uFillTx/>
+              <a:latin typeface="Calibri" panose="020F0502020204030204" pitchFamily="34" charset="0"/>
+              <a:ea typeface="맑은 고딕"/>
+            </a:endParaRPr>
+          </a:p>
+        </p:txBody>
+      </p:sp>
     </p:spTree>
     <p:extLst>
       <p:ext uri="{BB962C8B-B14F-4D97-AF65-F5344CB8AC3E}">

</xml_diff>

<commit_message>
chore: endpoint of /quotas/{name}/proxies/{name}
</commit_message>
<xml_diff>
--- a/docs/nginx-quota-limit.pptx
+++ b/docs/nginx-quota-limit.pptx
@@ -6987,7 +6987,7 @@
         </p:blipFill>
         <p:spPr>
           <a:xfrm>
-            <a:off x="3486907" y="1297406"/>
+            <a:off x="3410707" y="1297406"/>
             <a:ext cx="1219200" cy="1089285"/>
           </a:xfrm>
           <a:prstGeom prst="rect">
@@ -7017,7 +7017,7 @@
         </p:blipFill>
         <p:spPr>
           <a:xfrm>
-            <a:off x="7974977" y="1130300"/>
+            <a:off x="7898777" y="1130300"/>
             <a:ext cx="1159746" cy="1256391"/>
           </a:xfrm>
           <a:prstGeom prst="rect">
@@ -7633,7 +7633,7 @@
         </p:blipFill>
         <p:spPr>
           <a:xfrm>
-            <a:off x="1562724" y="1545056"/>
+            <a:off x="1816724" y="1545056"/>
             <a:ext cx="584200" cy="596900"/>
           </a:xfrm>
           <a:prstGeom prst="rect">
@@ -7655,7 +7655,7 @@
         </p:nvSpPr>
         <p:spPr>
           <a:xfrm>
-            <a:off x="1376627" y="2150948"/>
+            <a:off x="1630627" y="2150948"/>
             <a:ext cx="962312" cy="169277"/>
           </a:xfrm>
           <a:prstGeom prst="rect">
@@ -7694,14 +7694,14 @@
           <p:nvPr>
             <p:extLst>
               <p:ext uri="{D42A27DB-BD31-4B8C-83A1-F6EECF244321}">
-                <p14:modId xmlns:p14="http://schemas.microsoft.com/office/powerpoint/2010/main" val="2040990105"/>
+                <p14:modId xmlns:p14="http://schemas.microsoft.com/office/powerpoint/2010/main" val="2832142862"/>
               </p:ext>
             </p:extLst>
           </p:nvPr>
         </p:nvGraphicFramePr>
         <p:xfrm>
-          <a:off x="910359" y="3302000"/>
-          <a:ext cx="5353114" cy="2663952"/>
+          <a:off x="1799359" y="3302000"/>
+          <a:ext cx="4591384" cy="2663952"/>
         </p:xfrm>
         <a:graphic>
           <a:graphicData uri="http://schemas.openxmlformats.org/drawingml/2006/table">
@@ -7759,13 +7759,6 @@
                     </a:ext>
                   </a:extLst>
                 </a:gridCol>
-                <a:gridCol w="761730">
-                  <a:extLst>
-                    <a:ext uri="{9D8B030D-6E8A-4147-A177-3AD203B41FA5}">
-                      <a16:colId xmlns:a16="http://schemas.microsoft.com/office/drawing/2014/main" val="2247848435"/>
-                    </a:ext>
-                  </a:extLst>
-                </a:gridCol>
               </a:tblGrid>
               <a:tr h="138707">
                 <a:tc>
@@ -7903,20 +7896,6 @@
                       <a:r>
                         <a:rPr lang="en-US" sz="1100" dirty="0"/>
                         <a:t>Per</a:t>
-                      </a:r>
-                    </a:p>
-                  </a:txBody>
-                  <a:tcPr marL="45720" marR="45720" marT="54864" marB="54864" anchor="ctr"/>
-                </a:tc>
-                <a:tc>
-                  <a:txBody>
-                    <a:bodyPr/>
-                    <a:lstStyle/>
-                    <a:p>
-                      <a:pPr algn="ctr"/>
-                      <a:r>
-                        <a:rPr lang="en-US" sz="1100" dirty="0"/>
-                        <a:t>Status</a:t>
                       </a:r>
                     </a:p>
                   </a:txBody>
@@ -8084,24 +8063,6 @@
                   </a:txBody>
                   <a:tcPr marL="45720" marR="45720" marT="54864" marB="54864" anchor="ctr"/>
                 </a:tc>
-                <a:tc>
-                  <a:txBody>
-                    <a:bodyPr/>
-                    <a:lstStyle/>
-                    <a:p>
-                      <a:pPr algn="ctr"/>
-                      <a:endParaRPr lang="en-US" sz="1100" dirty="0">
-                        <a:solidFill>
-                          <a:schemeClr val="tx1">
-                            <a:lumMod val="50000"/>
-                            <a:lumOff val="50000"/>
-                          </a:schemeClr>
-                        </a:solidFill>
-                      </a:endParaRPr>
-                    </a:p>
-                  </a:txBody>
-                  <a:tcPr marL="45720" marR="45720" marT="54864" marB="54864" anchor="ctr"/>
-                </a:tc>
                 <a:extLst>
                   <a:ext uri="{0D108BD9-81ED-4DB2-BD59-A6C34878D82A}">
                     <a16:rowId xmlns:a16="http://schemas.microsoft.com/office/drawing/2014/main" val="3696697835"/>
@@ -8264,24 +8225,6 @@
                   </a:txBody>
                   <a:tcPr marL="45720" marR="45720" marT="54864" marB="54864" anchor="ctr"/>
                 </a:tc>
-                <a:tc>
-                  <a:txBody>
-                    <a:bodyPr/>
-                    <a:lstStyle/>
-                    <a:p>
-                      <a:pPr algn="ctr"/>
-                      <a:endParaRPr lang="en-US" sz="1100" dirty="0">
-                        <a:solidFill>
-                          <a:schemeClr val="tx1">
-                            <a:lumMod val="50000"/>
-                            <a:lumOff val="50000"/>
-                          </a:schemeClr>
-                        </a:solidFill>
-                      </a:endParaRPr>
-                    </a:p>
-                  </a:txBody>
-                  <a:tcPr marL="45720" marR="45720" marT="54864" marB="54864" anchor="ctr"/>
-                </a:tc>
                 <a:extLst>
                   <a:ext uri="{0D108BD9-81ED-4DB2-BD59-A6C34878D82A}">
                     <a16:rowId xmlns:a16="http://schemas.microsoft.com/office/drawing/2014/main" val="766933177"/>
@@ -8444,24 +8387,6 @@
                   </a:txBody>
                   <a:tcPr marL="45720" marR="45720" marT="54864" marB="54864" anchor="ctr"/>
                 </a:tc>
-                <a:tc>
-                  <a:txBody>
-                    <a:bodyPr/>
-                    <a:lstStyle/>
-                    <a:p>
-                      <a:pPr algn="ctr"/>
-                      <a:endParaRPr lang="en-US" sz="1100" dirty="0">
-                        <a:solidFill>
-                          <a:schemeClr val="tx1">
-                            <a:lumMod val="50000"/>
-                            <a:lumOff val="50000"/>
-                          </a:schemeClr>
-                        </a:solidFill>
-                      </a:endParaRPr>
-                    </a:p>
-                  </a:txBody>
-                  <a:tcPr marL="45720" marR="45720" marT="54864" marB="54864" anchor="ctr"/>
-                </a:tc>
                 <a:extLst>
                   <a:ext uri="{0D108BD9-81ED-4DB2-BD59-A6C34878D82A}">
                     <a16:rowId xmlns:a16="http://schemas.microsoft.com/office/drawing/2014/main" val="2180011922"/>
@@ -8624,24 +8549,6 @@
                   </a:txBody>
                   <a:tcPr marL="45720" marR="45720" marT="54864" marB="54864" anchor="ctr"/>
                 </a:tc>
-                <a:tc>
-                  <a:txBody>
-                    <a:bodyPr/>
-                    <a:lstStyle/>
-                    <a:p>
-                      <a:pPr algn="ctr"/>
-                      <a:endParaRPr lang="en-US" sz="1100" dirty="0">
-                        <a:solidFill>
-                          <a:schemeClr val="tx1">
-                            <a:lumMod val="50000"/>
-                            <a:lumOff val="50000"/>
-                          </a:schemeClr>
-                        </a:solidFill>
-                      </a:endParaRPr>
-                    </a:p>
-                  </a:txBody>
-                  <a:tcPr marL="45720" marR="45720" marT="54864" marB="54864" anchor="ctr"/>
-                </a:tc>
                 <a:extLst>
                   <a:ext uri="{0D108BD9-81ED-4DB2-BD59-A6C34878D82A}">
                     <a16:rowId xmlns:a16="http://schemas.microsoft.com/office/drawing/2014/main" val="1680627438"/>
@@ -8748,20 +8655,6 @@
                   </a:txBody>
                   <a:tcPr marL="45720" marR="45720" marT="54864" marB="54864" anchor="ctr"/>
                 </a:tc>
-                <a:tc>
-                  <a:txBody>
-                    <a:bodyPr/>
-                    <a:lstStyle/>
-                    <a:p>
-                      <a:pPr algn="ctr"/>
-                      <a:r>
-                        <a:rPr lang="en-US" sz="1100" dirty="0"/>
-                        <a:t>Configured</a:t>
-                      </a:r>
-                    </a:p>
-                  </a:txBody>
-                  <a:tcPr marL="45720" marR="45720" marT="54864" marB="54864" anchor="ctr"/>
-                </a:tc>
                 <a:extLst>
                   <a:ext uri="{0D108BD9-81ED-4DB2-BD59-A6C34878D82A}">
                     <a16:rowId xmlns:a16="http://schemas.microsoft.com/office/drawing/2014/main" val="1315330364"/>
@@ -8864,17 +8757,6 @@
                         <a:rPr lang="en-US" sz="1100" dirty="0"/>
                         <a:t>r/M</a:t>
                       </a:r>
-                    </a:p>
-                  </a:txBody>
-                  <a:tcPr marL="45720" marR="45720" marT="54864" marB="54864" anchor="ctr"/>
-                </a:tc>
-                <a:tc>
-                  <a:txBody>
-                    <a:bodyPr/>
-                    <a:lstStyle/>
-                    <a:p>
-                      <a:pPr algn="ctr"/>
-                      <a:endParaRPr lang="en-US" sz="1100" dirty="0"/>
                     </a:p>
                   </a:txBody>
                   <a:tcPr marL="45720" marR="45720" marT="54864" marB="54864" anchor="ctr"/>
@@ -9029,24 +8911,6 @@
                         </a:rPr>
                         <a:t>r/M</a:t>
                       </a:r>
-                    </a:p>
-                  </a:txBody>
-                  <a:tcPr marL="45720" marR="45720" marT="54864" marB="54864" anchor="ctr"/>
-                </a:tc>
-                <a:tc>
-                  <a:txBody>
-                    <a:bodyPr/>
-                    <a:lstStyle/>
-                    <a:p>
-                      <a:pPr algn="ctr"/>
-                      <a:endParaRPr lang="en-US" sz="1100" dirty="0">
-                        <a:solidFill>
-                          <a:schemeClr val="tx1">
-                            <a:lumMod val="50000"/>
-                            <a:lumOff val="50000"/>
-                          </a:schemeClr>
-                        </a:solidFill>
-                      </a:endParaRPr>
                     </a:p>
                   </a:txBody>
                   <a:tcPr marL="45720" marR="45720" marT="54864" marB="54864" anchor="ctr"/>
@@ -9221,24 +9085,6 @@
                   </a:txBody>
                   <a:tcPr marL="45720" marR="45720" marT="54864" marB="54864" anchor="ctr"/>
                 </a:tc>
-                <a:tc>
-                  <a:txBody>
-                    <a:bodyPr/>
-                    <a:lstStyle/>
-                    <a:p>
-                      <a:pPr algn="ctr"/>
-                      <a:endParaRPr lang="en-US" sz="1100" dirty="0">
-                        <a:solidFill>
-                          <a:schemeClr val="tx1">
-                            <a:lumMod val="50000"/>
-                            <a:lumOff val="50000"/>
-                          </a:schemeClr>
-                        </a:solidFill>
-                      </a:endParaRPr>
-                    </a:p>
-                  </a:txBody>
-                  <a:tcPr marL="45720" marR="45720" marT="54864" marB="54864" anchor="ctr"/>
-                </a:tc>
                 <a:extLst>
                   <a:ext uri="{0D108BD9-81ED-4DB2-BD59-A6C34878D82A}">
                     <a16:rowId xmlns:a16="http://schemas.microsoft.com/office/drawing/2014/main" val="3705143254"/>
@@ -9263,7 +9109,7 @@
         </p:nvSpPr>
         <p:spPr>
           <a:xfrm>
-            <a:off x="4605616" y="2637256"/>
+            <a:off x="4529416" y="2637256"/>
             <a:ext cx="955592" cy="594050"/>
           </a:xfrm>
           <a:prstGeom prst="can">
@@ -9345,8 +9191,8 @@
         </p:nvCxnSpPr>
         <p:spPr>
           <a:xfrm flipH="1">
-            <a:off x="2146924" y="1842049"/>
-            <a:ext cx="1339983" cy="1457"/>
+            <a:off x="2400924" y="1842049"/>
+            <a:ext cx="1009783" cy="1457"/>
           </a:xfrm>
           <a:prstGeom prst="straightConnector1">
             <a:avLst/>
@@ -9390,7 +9236,7 @@
         </p:nvCxnSpPr>
         <p:spPr>
           <a:xfrm flipH="1" flipV="1">
-            <a:off x="5561208" y="2112740"/>
+            <a:off x="5485008" y="2112740"/>
             <a:ext cx="1579768" cy="12844"/>
           </a:xfrm>
           <a:prstGeom prst="straightConnector1">
@@ -9431,7 +9277,7 @@
         </p:nvSpPr>
         <p:spPr>
           <a:xfrm>
-            <a:off x="7140976" y="1945976"/>
+            <a:off x="7064776" y="1945976"/>
             <a:ext cx="960120" cy="359215"/>
           </a:xfrm>
           <a:prstGeom prst="rect">
@@ -9521,8 +9367,8 @@
         </p:nvSpPr>
         <p:spPr>
           <a:xfrm>
-            <a:off x="2189488" y="1472964"/>
-            <a:ext cx="1371139" cy="338554"/>
+            <a:off x="2405389" y="1434864"/>
+            <a:ext cx="1115382" cy="338554"/>
           </a:xfrm>
           <a:prstGeom prst="rect">
             <a:avLst/>
@@ -9537,13 +9383,13 @@
           <a:p>
             <a:r>
               <a:rPr lang="en-US" sz="1100" dirty="0"/>
-              <a:t>Create a quota policy</a:t>
+              <a:t>Create a quota</a:t>
             </a:r>
           </a:p>
           <a:p>
             <a:r>
               <a:rPr lang="en-US" sz="1100" dirty="0"/>
-              <a:t>Set quotas per proxy</a:t>
+              <a:t>Set quota per API</a:t>
             </a:r>
           </a:p>
         </p:txBody>
@@ -9562,7 +9408,7 @@
         </p:nvSpPr>
         <p:spPr>
           <a:xfrm>
-            <a:off x="4605616" y="1933131"/>
+            <a:off x="4529416" y="1933131"/>
             <a:ext cx="955592" cy="359218"/>
           </a:xfrm>
           <a:prstGeom prst="rect">
@@ -9652,7 +9498,7 @@
         </p:nvSpPr>
         <p:spPr>
           <a:xfrm>
-            <a:off x="4605616" y="1428228"/>
+            <a:off x="4529416" y="1428228"/>
             <a:ext cx="955592" cy="359218"/>
           </a:xfrm>
           <a:prstGeom prst="rect">
@@ -9739,7 +9585,7 @@
         </p:nvSpPr>
         <p:spPr>
           <a:xfrm>
-            <a:off x="7145504" y="1445107"/>
+            <a:off x="7069304" y="1445107"/>
             <a:ext cx="955592" cy="359218"/>
           </a:xfrm>
           <a:prstGeom prst="rect">
@@ -9824,7 +9670,7 @@
         </p:nvCxnSpPr>
         <p:spPr>
           <a:xfrm>
-            <a:off x="5083412" y="1787446"/>
+            <a:off x="5007212" y="1787446"/>
             <a:ext cx="0" cy="145685"/>
           </a:xfrm>
           <a:prstGeom prst="straightConnector1">
@@ -9869,7 +9715,7 @@
         </p:nvCxnSpPr>
         <p:spPr>
           <a:xfrm flipH="1" flipV="1">
-            <a:off x="5561208" y="1607837"/>
+            <a:off x="5485008" y="1607837"/>
             <a:ext cx="1584296" cy="16879"/>
           </a:xfrm>
           <a:prstGeom prst="straightConnector1">
@@ -9912,7 +9758,7 @@
         </p:nvSpPr>
         <p:spPr>
           <a:xfrm>
-            <a:off x="2019742" y="1467802"/>
+            <a:off x="2248342" y="1455102"/>
             <a:ext cx="137160" cy="137160"/>
           </a:xfrm>
           <a:prstGeom prst="ellipse">
@@ -9973,7 +9819,7 @@
         </p:nvSpPr>
         <p:spPr>
           <a:xfrm>
-            <a:off x="5821688" y="1409464"/>
+            <a:off x="5745488" y="1409464"/>
             <a:ext cx="1281187" cy="169277"/>
           </a:xfrm>
           <a:prstGeom prst="rect">
@@ -10010,7 +9856,7 @@
         </p:nvSpPr>
         <p:spPr>
           <a:xfrm>
-            <a:off x="5626542" y="1429702"/>
+            <a:off x="5550342" y="1429702"/>
             <a:ext cx="137160" cy="137160"/>
           </a:xfrm>
           <a:prstGeom prst="ellipse">
@@ -10071,7 +9917,7 @@
         </p:nvGrpSpPr>
         <p:grpSpPr>
           <a:xfrm>
-            <a:off x="9014196" y="2103676"/>
+            <a:off x="8937996" y="2103676"/>
             <a:ext cx="1310701" cy="969724"/>
             <a:chOff x="8666398" y="2434230"/>
             <a:chExt cx="1718658" cy="768522"/>
@@ -10227,7 +10073,7 @@
         </p:nvCxnSpPr>
         <p:spPr>
           <a:xfrm rot="5400000" flipH="1" flipV="1">
-            <a:off x="8633228" y="397079"/>
+            <a:off x="8557028" y="397079"/>
             <a:ext cx="38100" cy="2057956"/>
           </a:xfrm>
           <a:prstGeom prst="bentConnector3">
@@ -10275,7 +10121,7 @@
         </p:nvSpPr>
         <p:spPr>
           <a:xfrm>
-            <a:off x="8069588" y="837965"/>
+            <a:off x="7993388" y="837965"/>
             <a:ext cx="2509512" cy="169277"/>
           </a:xfrm>
           <a:prstGeom prst="rect">
@@ -10312,7 +10158,7 @@
         </p:nvSpPr>
         <p:spPr>
           <a:xfrm>
-            <a:off x="7874442" y="858202"/>
+            <a:off x="7798242" y="858202"/>
             <a:ext cx="137160" cy="137160"/>
           </a:xfrm>
           <a:prstGeom prst="ellipse">
@@ -10385,13 +10231,13 @@
         </p:nvCxnSpPr>
         <p:spPr>
           <a:xfrm rot="16200000" flipH="1">
-            <a:off x="8402382" y="666024"/>
+            <a:off x="8326182" y="666024"/>
             <a:ext cx="1143431" cy="2701597"/>
           </a:xfrm>
           <a:prstGeom prst="bentConnector4">
             <a:avLst>
               <a:gd name="adj1" fmla="val -35542"/>
-              <a:gd name="adj2" fmla="val 108462"/>
+              <a:gd name="adj2" fmla="val 105171"/>
             </a:avLst>
           </a:prstGeom>
           <a:ln w="3175">
@@ -10434,7 +10280,7 @@
         </p:nvGrpSpPr>
         <p:grpSpPr>
           <a:xfrm>
-            <a:off x="9032153" y="1407007"/>
+            <a:off x="8955953" y="1407007"/>
             <a:ext cx="1298210" cy="464724"/>
             <a:chOff x="4546599" y="2111542"/>
             <a:chExt cx="1094509" cy="530057"/>
@@ -10625,8 +10471,8 @@
         </p:nvSpPr>
         <p:spPr>
           <a:xfrm>
-            <a:off x="7115575" y="3284833"/>
-            <a:ext cx="3908025" cy="1631216"/>
+            <a:off x="6683776" y="3284833"/>
+            <a:ext cx="3590524" cy="1631216"/>
           </a:xfrm>
           <a:prstGeom prst="rect">
             <a:avLst/>
@@ -10925,8 +10771,8 @@
         </p:nvSpPr>
         <p:spPr>
           <a:xfrm>
-            <a:off x="7115576" y="5038253"/>
-            <a:ext cx="3908025" cy="1323439"/>
+            <a:off x="6683777" y="5038253"/>
+            <a:ext cx="3590524" cy="1323439"/>
           </a:xfrm>
           <a:prstGeom prst="rect">
             <a:avLst/>
@@ -10959,7 +10805,7 @@
                 <a:effectLst/>
                 <a:latin typeface="Menlo" panose="020B0609030804020204" pitchFamily="49" charset="0"/>
               </a:rPr>
-              <a:t>quota_limit_per</a:t>
+              <a:t>limit_per</a:t>
             </a:r>
             <a:r>
               <a:rPr lang="en-US" sz="1000" b="0" dirty="0">
@@ -11161,7 +11007,7 @@
                 <a:effectLst/>
                 <a:latin typeface="Menlo" panose="020B0609030804020204" pitchFamily="49" charset="0"/>
               </a:rPr>
-              <a:t>quota_payment_method</a:t>
+              <a:t>quota_pay_method</a:t>
             </a:r>
             <a:r>
               <a:rPr lang="en-US" sz="1000" b="0" dirty="0">
@@ -11309,7 +11155,7 @@
         </p:nvSpPr>
         <p:spPr>
           <a:xfrm>
-            <a:off x="5821688" y="1930164"/>
+            <a:off x="5745488" y="1930164"/>
             <a:ext cx="1281187" cy="169277"/>
           </a:xfrm>
           <a:prstGeom prst="rect">
@@ -11346,7 +11192,7 @@
         </p:nvSpPr>
         <p:spPr>
           <a:xfrm>
-            <a:off x="5626542" y="1950402"/>
+            <a:off x="5550342" y="1950402"/>
             <a:ext cx="137160" cy="137160"/>
           </a:xfrm>
           <a:prstGeom prst="ellipse">
@@ -11419,7 +11265,7 @@
         </p:nvCxnSpPr>
         <p:spPr>
           <a:xfrm rot="16200000" flipH="1">
-            <a:off x="8175943" y="1750284"/>
+            <a:off x="8099743" y="1750284"/>
             <a:ext cx="283347" cy="1393160"/>
           </a:xfrm>
           <a:prstGeom prst="bentConnector2">
@@ -11465,7 +11311,7 @@
         </p:nvSpPr>
         <p:spPr>
           <a:xfrm>
-            <a:off x="7663188" y="2590564"/>
+            <a:off x="7586988" y="2590564"/>
             <a:ext cx="1281187" cy="338554"/>
           </a:xfrm>
           <a:prstGeom prst="rect">
@@ -11502,7 +11348,7 @@
         </p:nvSpPr>
         <p:spPr>
           <a:xfrm>
-            <a:off x="7455342" y="2636202"/>
+            <a:off x="7379142" y="2636202"/>
             <a:ext cx="137160" cy="137160"/>
           </a:xfrm>
           <a:prstGeom prst="ellipse">
@@ -11563,8 +11409,8 @@
         </p:nvSpPr>
         <p:spPr>
           <a:xfrm>
-            <a:off x="915881" y="4846641"/>
-            <a:ext cx="5353114" cy="548640"/>
+            <a:off x="1790698" y="4859341"/>
+            <a:ext cx="4591383" cy="548640"/>
           </a:xfrm>
           <a:prstGeom prst="rect">
             <a:avLst/>
@@ -11630,7 +11476,7 @@
         </p:nvSpPr>
         <p:spPr>
           <a:xfrm>
-            <a:off x="5351788" y="2361964"/>
+            <a:off x="5275588" y="2361964"/>
             <a:ext cx="1281187" cy="169277"/>
           </a:xfrm>
           <a:prstGeom prst="rect">
@@ -11667,7 +11513,7 @@
         </p:nvSpPr>
         <p:spPr>
           <a:xfrm>
-            <a:off x="5143942" y="2407602"/>
+            <a:off x="5067742" y="2407602"/>
             <a:ext cx="137160" cy="137160"/>
           </a:xfrm>
           <a:prstGeom prst="ellipse">
@@ -11732,7 +11578,7 @@
         </p:nvCxnSpPr>
         <p:spPr>
           <a:xfrm flipV="1">
-            <a:off x="5083412" y="2292349"/>
+            <a:off x="5007212" y="2292349"/>
             <a:ext cx="0" cy="344907"/>
           </a:xfrm>
           <a:prstGeom prst="straightConnector1">
@@ -11773,8 +11619,8 @@
         </p:nvSpPr>
         <p:spPr>
           <a:xfrm>
-            <a:off x="915880" y="6079750"/>
-            <a:ext cx="5347593" cy="249299"/>
+            <a:off x="1799359" y="6054350"/>
+            <a:ext cx="4591384" cy="307344"/>
           </a:xfrm>
           <a:prstGeom prst="rect">
             <a:avLst/>
@@ -11786,8 +11632,8 @@
           </a:solidFill>
         </p:spPr>
         <p:txBody>
-          <a:bodyPr wrap="square" tIns="54864" bIns="54864">
-            <a:spAutoFit/>
+          <a:bodyPr wrap="square" tIns="54864" bIns="54864" anchor="ctr" anchorCtr="0">
+            <a:noAutofit/>
           </a:bodyPr>
           <a:lstStyle/>
           <a:p>
@@ -11799,27 +11645,7 @@
                 <a:effectLst/>
                 <a:latin typeface="Menlo" panose="020B0609030804020204" pitchFamily="49" charset="0"/>
               </a:rPr>
-              <a:t>Quota Name </a:t>
-            </a:r>
-            <a:r>
-              <a:rPr lang="en-US" sz="900" b="0" dirty="0">
-                <a:solidFill>
-                  <a:srgbClr val="569CD6"/>
-                </a:solidFill>
-                <a:effectLst/>
-                <a:latin typeface="Menlo" panose="020B0609030804020204" pitchFamily="49" charset="0"/>
-              </a:rPr>
-              <a:t>Convention</a:t>
-            </a:r>
-            <a:r>
-              <a:rPr lang="en-US" sz="900" b="0" dirty="0">
-                <a:solidFill>
-                  <a:srgbClr val="D4D4D4"/>
-                </a:solidFill>
-                <a:effectLst/>
-                <a:latin typeface="Menlo" panose="020B0609030804020204" pitchFamily="49" charset="0"/>
-              </a:rPr>
-              <a:t> = </a:t>
+              <a:t>Quota Name = </a:t>
             </a:r>
             <a:r>
               <a:rPr lang="en-US" sz="900" b="0" dirty="0" err="1">
@@ -11857,7 +11683,7 @@
         </p:nvCxnSpPr>
         <p:spPr>
           <a:xfrm flipV="1">
-            <a:off x="9669547" y="3048000"/>
+            <a:off x="9593347" y="3048000"/>
             <a:ext cx="0" cy="228600"/>
           </a:xfrm>
           <a:prstGeom prst="straightConnector1">
@@ -11902,12 +11728,12 @@
         </p:nvCxnSpPr>
         <p:spPr>
           <a:xfrm>
-            <a:off x="10330363" y="1639369"/>
-            <a:ext cx="693238" cy="4060604"/>
+            <a:off x="10254163" y="1639369"/>
+            <a:ext cx="20138" cy="4060604"/>
           </a:xfrm>
           <a:prstGeom prst="bentConnector3">
             <a:avLst>
-              <a:gd name="adj1" fmla="val 132976"/>
+              <a:gd name="adj1" fmla="val 1298232"/>
             </a:avLst>
           </a:prstGeom>
           <a:ln w="3175">
@@ -11936,6 +11762,83 @@
           </a:fontRef>
         </p:style>
       </p:cxnSp>
+      <p:sp>
+        <p:nvSpPr>
+          <p:cNvPr id="142" name="TextBox 141">
+            <a:extLst>
+              <a:ext uri="{FF2B5EF4-FFF2-40B4-BE49-F238E27FC236}">
+                <a16:creationId xmlns:a16="http://schemas.microsoft.com/office/drawing/2014/main" id="{770A7F0B-EC56-B168-49F7-7440BD8FE9A1}"/>
+              </a:ext>
+            </a:extLst>
+          </p:cNvPr>
+          <p:cNvSpPr txBox="1"/>
+          <p:nvPr/>
+        </p:nvSpPr>
+        <p:spPr>
+          <a:xfrm>
+            <a:off x="7053588" y="2387363"/>
+            <a:ext cx="1721696" cy="153888"/>
+          </a:xfrm>
+          <a:prstGeom prst="rect">
+            <a:avLst/>
+          </a:prstGeom>
+          <a:solidFill>
+            <a:schemeClr val="accent4">
+              <a:lumMod val="20000"/>
+              <a:lumOff val="80000"/>
+              <a:alpha val="50000"/>
+            </a:schemeClr>
+          </a:solidFill>
+        </p:spPr>
+        <p:txBody>
+          <a:bodyPr wrap="square" lIns="0" tIns="0" rIns="0" bIns="0">
+            <a:spAutoFit/>
+          </a:bodyPr>
+          <a:lstStyle/>
+          <a:p>
+            <a:pPr algn="ctr"/>
+            <a:r>
+              <a:rPr lang="en-US" sz="1000" dirty="0"/>
+              <a:t>/quotas/{name}/proxies/{name}</a:t>
+            </a:r>
+          </a:p>
+        </p:txBody>
+      </p:sp>
+      <p:sp>
+        <p:nvSpPr>
+          <p:cNvPr id="143" name="TextBox 142">
+            <a:extLst>
+              <a:ext uri="{FF2B5EF4-FFF2-40B4-BE49-F238E27FC236}">
+                <a16:creationId xmlns:a16="http://schemas.microsoft.com/office/drawing/2014/main" id="{F45414A1-D2A4-ADB2-1A44-7A4A80AD7613}"/>
+              </a:ext>
+            </a:extLst>
+          </p:cNvPr>
+          <p:cNvSpPr txBox="1"/>
+          <p:nvPr/>
+        </p:nvSpPr>
+        <p:spPr>
+          <a:xfrm>
+            <a:off x="6692156" y="6367036"/>
+            <a:ext cx="3582144" cy="138499"/>
+          </a:xfrm>
+          <a:prstGeom prst="rect">
+            <a:avLst/>
+          </a:prstGeom>
+          <a:noFill/>
+        </p:spPr>
+        <p:txBody>
+          <a:bodyPr wrap="square" lIns="0" tIns="0" rIns="0" bIns="0">
+            <a:spAutoFit/>
+          </a:bodyPr>
+          <a:lstStyle/>
+          <a:p>
+            <a:r>
+              <a:rPr lang="en-US" sz="900" dirty="0"/>
+              <a:t>* If map size is too big, then it can be moved to (local/remote) key/val store.</a:t>
+            </a:r>
+          </a:p>
+        </p:txBody>
+      </p:sp>
     </p:spTree>
     <p:extLst>
       <p:ext uri="{BB962C8B-B14F-4D97-AF65-F5344CB8AC3E}">

</xml_diff>

<commit_message>
fix: async handler for notification & decrement quota
</commit_message>
<xml_diff>
--- a/docs/nginx-quota-limit.pptx
+++ b/docs/nginx-quota-limit.pptx
@@ -42545,7 +42545,7 @@
                 <a:latin typeface="Calibri" panose="020F0502020204030204" pitchFamily="34" charset="0"/>
                 <a:ea typeface="맑은 고딕"/>
               </a:rPr>
-              <a:t> Thread</a:t>
+              <a:t> Handler</a:t>
             </a:r>
             <a:endParaRPr kumimoji="0" lang="ko-KR" altLang="en-US" sz="1100" b="0" i="0" u="none" strike="noStrike" kern="0" cap="none" spc="0" normalizeH="0" baseline="0" noProof="0" dirty="0">
               <a:ln>
@@ -42643,7 +42643,7 @@
                 <a:latin typeface="Calibri" panose="020F0502020204030204" pitchFamily="34" charset="0"/>
                 <a:ea typeface="맑은 고딕"/>
               </a:rPr>
-              <a:t> Thread</a:t>
+              <a:t> Handler</a:t>
             </a:r>
             <a:endParaRPr kumimoji="0" lang="ko-KR" altLang="en-US" sz="1100" b="0" i="0" u="none" strike="noStrike" kern="0" cap="none" spc="0" normalizeH="0" baseline="0" noProof="0" dirty="0">
               <a:ln>

</xml_diff>